<commit_message>
moved from localSetupGLite to localSetupEmi newer version of isDSinFAX.py
</commit_message>
<xml_diff>
--- a/Tutorial.pptx
+++ b/Tutorial.pptx
@@ -224,7 +224,7 @@
           <a:p>
             <a:fld id="{92E9B281-BA54-794C-ACD8-2D743C591A6A}" type="datetime1">
               <a:rPr lang="en-US" smtClean="0"/>
-              <a:t>7/16/13</a:t>
+              <a:t>11/6/13</a:t>
             </a:fld>
             <a:endParaRPr lang="en-US"/>
           </a:p>
@@ -390,7 +390,7 @@
           <a:p>
             <a:fld id="{B19DBBA3-98AD-944B-8B8B-5B9FFC955A4F}" type="datetime1">
               <a:rPr lang="en-US" smtClean="0"/>
-              <a:t>7/16/13</a:t>
+              <a:t>11/6/13</a:t>
             </a:fld>
             <a:endParaRPr lang="en-US"/>
           </a:p>
@@ -3061,7 +3061,7 @@
           <a:p>
             <a:fld id="{5A777D2D-388A-5249-B920-6B487891E39C}" type="datetime1">
               <a:rPr lang="en-US" smtClean="0"/>
-              <a:t>7/16/13</a:t>
+              <a:t>11/6/13</a:t>
             </a:fld>
             <a:endParaRPr lang="en-US"/>
           </a:p>
@@ -4170,7 +4170,7 @@
           <a:p>
             <a:fld id="{B3706F72-1B1B-7D49-8F06-553DBF27354F}" type="datetime1">
               <a:rPr lang="en-US" smtClean="0"/>
-              <a:t>7/16/13</a:t>
+              <a:t>11/6/13</a:t>
             </a:fld>
             <a:endParaRPr lang="en-US"/>
           </a:p>
@@ -5287,7 +5287,7 @@
           <a:p>
             <a:fld id="{33868D22-1979-9941-89D2-960890592796}" type="datetime1">
               <a:rPr lang="en-US" smtClean="0"/>
-              <a:t>7/16/13</a:t>
+              <a:t>11/6/13</a:t>
             </a:fld>
             <a:endParaRPr lang="en-US"/>
           </a:p>
@@ -6399,7 +6399,7 @@
           <a:p>
             <a:fld id="{7DA83AE1-CB64-784C-9A8F-13236E608BC8}" type="datetime1">
               <a:rPr lang="en-US" smtClean="0"/>
-              <a:t>7/16/13</a:t>
+              <a:t>11/6/13</a:t>
             </a:fld>
             <a:endParaRPr lang="en-US"/>
           </a:p>
@@ -7996,7 +7996,7 @@
           <a:p>
             <a:fld id="{706B2D66-2453-CA4D-911E-49DA97530D5E}" type="datetime1">
               <a:rPr lang="en-US" smtClean="0"/>
-              <a:t>7/16/13</a:t>
+              <a:t>11/6/13</a:t>
             </a:fld>
             <a:endParaRPr lang="en-US"/>
           </a:p>
@@ -9058,7 +9058,7 @@
           <a:p>
             <a:fld id="{90FEEE81-71E4-A542-ADFF-2E09FBD3072E}" type="datetime1">
               <a:rPr lang="en-US" smtClean="0"/>
-              <a:t>7/16/13</a:t>
+              <a:t>11/6/13</a:t>
             </a:fld>
             <a:endParaRPr lang="en-US"/>
           </a:p>
@@ -10389,7 +10389,7 @@
           <a:p>
             <a:fld id="{62BDF073-ACE3-A84C-B243-6B11C0476D96}" type="datetime1">
               <a:rPr lang="en-US" smtClean="0"/>
-              <a:t>7/16/13</a:t>
+              <a:t>11/6/13</a:t>
             </a:fld>
             <a:endParaRPr lang="en-US"/>
           </a:p>
@@ -11530,7 +11530,7 @@
           <a:p>
             <a:fld id="{A4440ACC-86DF-6048-A4D0-BE1043AA6C73}" type="datetime1">
               <a:rPr lang="en-US" smtClean="0"/>
-              <a:t>7/16/13</a:t>
+              <a:t>11/6/13</a:t>
             </a:fld>
             <a:endParaRPr lang="en-US"/>
           </a:p>
@@ -12590,7 +12590,7 @@
           <a:p>
             <a:fld id="{78CB6171-CF12-4A4C-B605-2C23CF5C25F9}" type="datetime1">
               <a:rPr lang="en-US" smtClean="0"/>
-              <a:t>7/16/13</a:t>
+              <a:t>11/6/13</a:t>
             </a:fld>
             <a:endParaRPr lang="en-US"/>
           </a:p>
@@ -13632,7 +13632,7 @@
           <a:p>
             <a:fld id="{B5B4C014-2DF0-6A4A-A8CD-F451B1E6A4CA}" type="datetime1">
               <a:rPr lang="en-US" smtClean="0"/>
-              <a:t>7/16/13</a:t>
+              <a:t>11/6/13</a:t>
             </a:fld>
             <a:endParaRPr lang="en-US"/>
           </a:p>
@@ -14871,7 +14871,7 @@
           <a:p>
             <a:fld id="{62AE354E-D8E4-5F49-A393-E13667096BD7}" type="datetime1">
               <a:rPr lang="en-US" smtClean="0"/>
-              <a:t>7/16/13</a:t>
+              <a:t>11/6/13</a:t>
             </a:fld>
             <a:endParaRPr lang="en-US"/>
           </a:p>
@@ -15228,7 +15228,7 @@
           <a:p>
             <a:fld id="{11FB6A6A-2DD6-924E-9F0A-D95C6BF58861}" type="datetime1">
               <a:rPr lang="en-US" smtClean="0"/>
-              <a:t>7/16/13</a:t>
+              <a:t>11/6/13</a:t>
             </a:fld>
             <a:endParaRPr lang="en-US"/>
           </a:p>
@@ -15840,11 +15840,7 @@
           <a:p>
             <a:r>
               <a:rPr lang="en-US" b="1" dirty="0" smtClean="0"/>
-              <a:t>University </a:t>
-            </a:r>
-            <a:r>
-              <a:rPr lang="en-US" b="1" dirty="0" smtClean="0"/>
-              <a:t>of Chicago</a:t>
+              <a:t>University of Chicago</a:t>
             </a:r>
           </a:p>
           <a:p>
@@ -15992,7 +15988,7 @@
           <a:p>
             <a:fld id="{7DA83AE1-CB64-784C-9A8F-13236E608BC8}" type="datetime1">
               <a:rPr lang="en-US" smtClean="0"/>
-              <a:t>7/16/13</a:t>
+              <a:t>11/6/13</a:t>
             </a:fld>
             <a:endParaRPr lang="en-US"/>
           </a:p>
@@ -16259,7 +16255,7 @@
                 <a:latin typeface="Consolas"/>
                 <a:cs typeface="Consolas"/>
               </a:rPr>
-              <a:t>localSetupGLite</a:t>
+              <a:t>localSetupEmi</a:t>
             </a:r>
             <a:endParaRPr lang="en-US" sz="1400" b="1" dirty="0">
               <a:solidFill>
@@ -16719,7 +16715,7 @@
           <a:p>
             <a:fld id="{7DA83AE1-CB64-784C-9A8F-13236E608BC8}" type="datetime1">
               <a:rPr lang="en-US" smtClean="0"/>
-              <a:t>7/16/13</a:t>
+              <a:t>11/6/13</a:t>
             </a:fld>
             <a:endParaRPr lang="en-US"/>
           </a:p>
@@ -17523,7 +17519,7 @@
           <a:p>
             <a:fld id="{D9EC7038-F29E-FB43-80D2-9BA032D63C30}" type="datetime1">
               <a:rPr lang="en-US" smtClean="0"/>
-              <a:t>7/16/13</a:t>
+              <a:t>11/6/13</a:t>
             </a:fld>
             <a:endParaRPr lang="en-US"/>
           </a:p>
@@ -17930,15 +17926,7 @@
             </a:pPr>
             <a:r>
               <a:rPr lang="en-US" sz="1800" dirty="0" smtClean="0"/>
-              <a:t>Ideally </a:t>
-            </a:r>
-            <a:r>
-              <a:rPr lang="en-US" sz="1800" dirty="0" smtClean="0"/>
-              <a:t>choose the nearest Tier 2 or Tier </a:t>
-            </a:r>
-            <a:r>
-              <a:rPr lang="en-US" sz="1800" dirty="0" smtClean="0"/>
-              <a:t>1</a:t>
+              <a:t>Ideally choose the nearest Tier 2 or Tier 1</a:t>
             </a:r>
           </a:p>
           <a:p>
@@ -17953,13 +17941,8 @@
             </a:pPr>
             <a:r>
               <a:rPr lang="en-US" sz="1800" dirty="0" smtClean="0"/>
-              <a:t>If not </a:t>
-            </a:r>
-            <a:r>
-              <a:rPr lang="en-US" sz="1800" dirty="0" smtClean="0"/>
-              <a:t>sure, you can use </a:t>
-            </a:r>
-            <a:endParaRPr lang="en-US" sz="1800" dirty="0" smtClean="0"/>
+              <a:t>If not sure, you can use </a:t>
+            </a:r>
           </a:p>
           <a:p>
             <a:pPr marL="68580" indent="0">
@@ -17967,11 +17950,7 @@
             </a:pPr>
             <a:r>
               <a:rPr lang="en-US" sz="1800" dirty="0" smtClean="0"/>
-              <a:t>root</a:t>
-            </a:r>
-            <a:r>
-              <a:rPr lang="en-US" sz="1800" dirty="0" smtClean="0"/>
-              <a:t>://glrd.usatlas.org</a:t>
+              <a:t>root://glrd.usatlas.org</a:t>
             </a:r>
             <a:r>
               <a:rPr lang="en-US" sz="1800" dirty="0"/>
@@ -18035,7 +18014,7 @@
           <a:p>
             <a:fld id="{D9EC7038-F29E-FB43-80D2-9BA032D63C30}" type="datetime1">
               <a:rPr lang="en-US" smtClean="0"/>
-              <a:t>7/16/13</a:t>
+              <a:t>11/6/13</a:t>
             </a:fld>
             <a:endParaRPr lang="en-US"/>
           </a:p>
@@ -18624,11 +18603,7 @@
                     <a:p>
                       <a:r>
                         <a:rPr lang="en-US" sz="1400" b="1" dirty="0" smtClean="0"/>
-                        <a:t>BNL </a:t>
-                      </a:r>
-                      <a:r>
-                        <a:rPr lang="en-US" sz="1400" b="1" dirty="0" smtClean="0"/>
-                        <a:t>Tier1</a:t>
+                        <a:t>BNL Tier1</a:t>
                       </a:r>
                       <a:endParaRPr lang="en-US" sz="1400" b="1" dirty="0"/>
                     </a:p>
@@ -18644,7 +18619,6 @@
                         <a:rPr lang="en-US" sz="1400" b="1" dirty="0" smtClean="0"/>
                         <a:t>dcdoor11.usatlas.bnl.gov</a:t>
                       </a:r>
-                      <a:endParaRPr lang="en-US" sz="1400" b="1" dirty="0" smtClean="0"/>
                     </a:p>
                   </a:txBody>
                   <a:tcPr/>
@@ -18736,7 +18710,7 @@
           <a:p>
             <a:fld id="{7DA83AE1-CB64-784C-9A8F-13236E608BC8}" type="datetime1">
               <a:rPr lang="en-US" smtClean="0"/>
-              <a:t>7/16/13</a:t>
+              <a:t>11/6/13</a:t>
             </a:fld>
             <a:endParaRPr lang="en-US"/>
           </a:p>
@@ -19089,7 +19063,7 @@
           <a:p>
             <a:fld id="{CDA00D33-FDA7-AD4E-9672-FAE71C1B59B7}" type="datetime1">
               <a:rPr lang="en-US" smtClean="0"/>
-              <a:t>7/16/13</a:t>
+              <a:t>11/6/13</a:t>
             </a:fld>
             <a:endParaRPr lang="en-US"/>
           </a:p>
@@ -20053,7 +20027,7 @@
           <a:p>
             <a:fld id="{044211E0-D98E-5D49-A016-8C1B10EEECE0}" type="datetime1">
               <a:rPr lang="en-US" smtClean="0"/>
-              <a:t>7/16/13</a:t>
+              <a:t>11/6/13</a:t>
             </a:fld>
             <a:endParaRPr lang="en-US"/>
           </a:p>
@@ -21517,7 +21491,7 @@
           <a:p>
             <a:fld id="{7DA83AE1-CB64-784C-9A8F-13236E608BC8}" type="datetime1">
               <a:rPr lang="en-US" smtClean="0"/>
-              <a:t>7/16/13</a:t>
+              <a:t>11/6/13</a:t>
             </a:fld>
             <a:endParaRPr lang="en-US"/>
           </a:p>
@@ -22371,7 +22345,7 @@
           <a:p>
             <a:fld id="{7DA83AE1-CB64-784C-9A8F-13236E608BC8}" type="datetime1">
               <a:rPr lang="en-US" smtClean="0"/>
-              <a:t>7/16/13</a:t>
+              <a:t>11/6/13</a:t>
             </a:fld>
             <a:endParaRPr lang="en-US"/>
           </a:p>
@@ -22994,7 +22968,7 @@
           <a:p>
             <a:fld id="{7DA83AE1-CB64-784C-9A8F-13236E608BC8}" type="datetime1">
               <a:rPr lang="en-US" smtClean="0"/>
-              <a:t>7/16/13</a:t>
+              <a:t>11/6/13</a:t>
             </a:fld>
             <a:endParaRPr lang="en-US"/>
           </a:p>
@@ -23204,7 +23178,7 @@
           <a:p>
             <a:fld id="{D329B981-814D-754C-B17B-7D2D90287C7C}" type="datetime1">
               <a:rPr lang="en-US" smtClean="0"/>
-              <a:t>7/16/13</a:t>
+              <a:t>11/6/13</a:t>
             </a:fld>
             <a:endParaRPr lang="en-US"/>
           </a:p>
@@ -23422,7 +23396,7 @@
           <a:p>
             <a:fld id="{7DA83AE1-CB64-784C-9A8F-13236E608BC8}" type="datetime1">
               <a:rPr lang="en-US" smtClean="0"/>
-              <a:t>7/16/13</a:t>
+              <a:t>11/6/13</a:t>
             </a:fld>
             <a:endParaRPr lang="en-US"/>
           </a:p>
@@ -24051,7 +24025,7 @@
           <a:p>
             <a:fld id="{75BE49D8-2F20-4D48-A630-E158AC0D08EF}" type="datetime1">
               <a:rPr lang="en-US" smtClean="0"/>
-              <a:t>7/16/13</a:t>
+              <a:t>11/6/13</a:t>
             </a:fld>
             <a:endParaRPr lang="en-US"/>
           </a:p>
@@ -25156,7 +25130,7 @@
           <a:p>
             <a:fld id="{6BFAC227-F055-EF47-8A9B-BE5B836CAA5B}" type="datetime1">
               <a:rPr lang="en-US" smtClean="0"/>
-              <a:t>7/16/13</a:t>
+              <a:t>11/6/13</a:t>
             </a:fld>
             <a:endParaRPr lang="en-US"/>
           </a:p>
@@ -25975,7 +25949,7 @@
           <a:p>
             <a:fld id="{6BFAC227-F055-EF47-8A9B-BE5B836CAA5B}" type="datetime1">
               <a:rPr lang="en-US" smtClean="0"/>
-              <a:t>7/16/13</a:t>
+              <a:t>11/6/13</a:t>
             </a:fld>
             <a:endParaRPr lang="en-US"/>
           </a:p>
@@ -27256,7 +27230,7 @@
           <a:p>
             <a:fld id="{7DA83AE1-CB64-784C-9A8F-13236E608BC8}" type="datetime1">
               <a:rPr lang="en-US" smtClean="0"/>
-              <a:t>7/16/13</a:t>
+              <a:t>11/6/13</a:t>
             </a:fld>
             <a:endParaRPr lang="en-US"/>
           </a:p>
@@ -28193,7 +28167,7 @@
           <a:p>
             <a:fld id="{7DA83AE1-CB64-784C-9A8F-13236E608BC8}" type="datetime1">
               <a:rPr lang="en-US" smtClean="0"/>
-              <a:t>7/16/13</a:t>
+              <a:t>11/6/13</a:t>
             </a:fld>
             <a:endParaRPr lang="en-US"/>
           </a:p>
@@ -28593,33 +28567,17 @@
                   <a:schemeClr val="bg1"/>
                 </a:solidFill>
               </a:rPr>
-              <a:t>190 MB</a:t>
-            </a:r>
+              <a:t>190 MB/s </a:t>
+            </a:r>
+          </a:p>
+          <a:p>
             <a:r>
               <a:rPr lang="en-US" sz="1600" b="1" dirty="0" smtClean="0">
                 <a:solidFill>
                   <a:schemeClr val="bg1"/>
                 </a:solidFill>
               </a:rPr>
-              <a:t>/s </a:t>
-            </a:r>
-          </a:p>
-          <a:p>
-            <a:r>
-              <a:rPr lang="en-US" sz="1600" b="1" dirty="0" smtClean="0">
-                <a:solidFill>
-                  <a:schemeClr val="bg1"/>
-                </a:solidFill>
-              </a:rPr>
-              <a:t>0.38 MB</a:t>
-            </a:r>
-            <a:r>
-              <a:rPr lang="en-US" sz="1600" b="1" dirty="0" smtClean="0">
-                <a:solidFill>
-                  <a:schemeClr val="bg1"/>
-                </a:solidFill>
-              </a:rPr>
-              <a:t>/s/core</a:t>
+              <a:t>0.38 MB/s/core</a:t>
             </a:r>
             <a:endParaRPr lang="en-US" sz="1600" b="1" dirty="0">
               <a:solidFill>
@@ -28945,7 +28903,13 @@
               <a:rPr lang="en-US" dirty="0" err="1" smtClean="0">
                 <a:hlinkClick r:id="rId5"/>
               </a:rPr>
-              <a:t>atlas-adc-federated-xrootd@cern.ch</a:t>
+              <a:t>atlas-adc</a:t>
+            </a:r>
+            <a:r>
+              <a:rPr lang="en-US" dirty="0" err="1" smtClean="0">
+                <a:hlinkClick r:id="rId5"/>
+              </a:rPr>
+              <a:t>-fax-operations@cern.ch</a:t>
             </a:r>
             <a:endParaRPr lang="en-US" dirty="0" smtClean="0"/>
           </a:p>
@@ -28971,7 +28935,7 @@
           <a:p>
             <a:fld id="{7DA83AE1-CB64-784C-9A8F-13236E608BC8}" type="datetime1">
               <a:rPr lang="en-US" smtClean="0"/>
-              <a:t>7/16/13</a:t>
+              <a:t>11/6/13</a:t>
             </a:fld>
             <a:endParaRPr lang="en-US"/>
           </a:p>
@@ -29099,7 +29063,7 @@
           <a:p>
             <a:fld id="{7DA83AE1-CB64-784C-9A8F-13236E608BC8}" type="datetime1">
               <a:rPr lang="en-US" smtClean="0"/>
-              <a:t>7/16/13</a:t>
+              <a:t>11/6/13</a:t>
             </a:fld>
             <a:endParaRPr lang="en-US"/>
           </a:p>
@@ -29270,7 +29234,7 @@
           <a:p>
             <a:fld id="{7DA83AE1-CB64-784C-9A8F-13236E608BC8}" type="datetime1">
               <a:rPr lang="en-US" smtClean="0"/>
-              <a:t>7/16/13</a:t>
+              <a:t>11/6/13</a:t>
             </a:fld>
             <a:endParaRPr lang="en-US"/>
           </a:p>
@@ -30015,7 +29979,7 @@
           <a:p>
             <a:fld id="{7DA83AE1-CB64-784C-9A8F-13236E608BC8}" type="datetime1">
               <a:rPr lang="en-US" smtClean="0"/>
-              <a:t>7/16/13</a:t>
+              <a:t>11/6/13</a:t>
             </a:fld>
             <a:endParaRPr lang="en-US"/>
           </a:p>
@@ -30179,7 +30143,15 @@
           <a:p>
             <a:r>
               <a:rPr lang="en-US" dirty="0" smtClean="0"/>
-              <a:t>Currently 40 sites are part of FAX (all </a:t>
+              <a:t>Currently </a:t>
+            </a:r>
+            <a:r>
+              <a:rPr lang="en-US" dirty="0" smtClean="0"/>
+              <a:t>44 </a:t>
+            </a:r>
+            <a:r>
+              <a:rPr lang="en-US" dirty="0" smtClean="0"/>
+              <a:t>sites are part of FAX (all </a:t>
             </a:r>
             <a:r>
               <a:rPr lang="en-US" dirty="0"/>
@@ -30216,7 +30188,7 @@
           <a:p>
             <a:fld id="{79C8D36C-4D1A-4A4B-A2DE-3FD323663130}" type="datetime1">
               <a:rPr lang="en-US" smtClean="0"/>
-              <a:t>7/16/13</a:t>
+              <a:t>11/6/13</a:t>
             </a:fld>
             <a:endParaRPr lang="en-US"/>
           </a:p>
@@ -30421,7 +30393,7 @@
           <a:p>
             <a:fld id="{7DA83AE1-CB64-784C-9A8F-13236E608BC8}" type="datetime1">
               <a:rPr lang="en-US" smtClean="0"/>
-              <a:t>7/16/13</a:t>
+              <a:t>11/6/13</a:t>
             </a:fld>
             <a:endParaRPr lang="en-US" dirty="0"/>
           </a:p>
@@ -31157,7 +31129,7 @@
           <a:p>
             <a:fld id="{7DA83AE1-CB64-784C-9A8F-13236E608BC8}" type="datetime1">
               <a:rPr lang="en-US" smtClean="0"/>
-              <a:t>7/16/13</a:t>
+              <a:t>11/6/13</a:t>
             </a:fld>
             <a:endParaRPr lang="en-US"/>
           </a:p>
@@ -31326,7 +31298,7 @@
           <a:p>
             <a:fld id="{7DA83AE1-CB64-784C-9A8F-13236E608BC8}" type="datetime1">
               <a:rPr lang="en-US" smtClean="0"/>
-              <a:t>7/16/13</a:t>
+              <a:t>11/6/13</a:t>
             </a:fld>
             <a:endParaRPr lang="en-US"/>
           </a:p>
@@ -34087,7 +34059,7 @@
           <a:p>
             <a:fld id="{7DA83AE1-CB64-784C-9A8F-13236E608BC8}" type="datetime1">
               <a:rPr lang="en-US" smtClean="0"/>
-              <a:t>7/16/13</a:t>
+              <a:t>11/6/13</a:t>
             </a:fld>
             <a:endParaRPr lang="en-US"/>
           </a:p>
@@ -37038,7 +37010,7 @@
           <a:p>
             <a:fld id="{5A9A4CA0-2DD9-1142-9E89-A008F169B6AB}" type="datetime1">
               <a:rPr lang="en-US" smtClean="0"/>
-              <a:t>7/16/13</a:t>
+              <a:t>11/6/13</a:t>
             </a:fld>
             <a:endParaRPr lang="en-US"/>
           </a:p>
@@ -37234,7 +37206,7 @@
           <a:p>
             <a:fld id="{7DA83AE1-CB64-784C-9A8F-13236E608BC8}" type="datetime1">
               <a:rPr lang="en-US" smtClean="0"/>
-              <a:t>7/16/13</a:t>
+              <a:t>11/6/13</a:t>
             </a:fld>
             <a:endParaRPr lang="en-US"/>
           </a:p>
@@ -37470,7 +37442,7 @@
           <a:p>
             <a:fld id="{7DA83AE1-CB64-784C-9A8F-13236E608BC8}" type="datetime1">
               <a:rPr lang="en-US" smtClean="0"/>
-              <a:t>7/16/13</a:t>
+              <a:t>11/6/13</a:t>
             </a:fld>
             <a:endParaRPr lang="en-US"/>
           </a:p>

</xml_diff>